<commit_message>
add draft info about Habitat Hack night
Signed-off-by: Nathen Harvey <nharvey@chef.io>
</commit_message>
<xml_diff>
--- a/pdf/DevOpsDC Nov 2016.pptx
+++ b/pdf/DevOpsDC Nov 2016.pptx
@@ -5,7 +5,7 @@
     <p:sldMasterId id="2147483660" r:id="rId1"/>
   </p:sldMasterIdLst>
   <p:notesMasterIdLst>
-    <p:notesMasterId r:id="rId12"/>
+    <p:notesMasterId r:id="rId13"/>
   </p:notesMasterIdLst>
   <p:sldIdLst>
     <p:sldId id="256" r:id="rId2"/>
@@ -16,8 +16,9 @@
     <p:sldId id="261" r:id="rId7"/>
     <p:sldId id="265" r:id="rId8"/>
     <p:sldId id="266" r:id="rId9"/>
-    <p:sldId id="268" r:id="rId10"/>
-    <p:sldId id="269" r:id="rId11"/>
+    <p:sldId id="270" r:id="rId10"/>
+    <p:sldId id="268" r:id="rId11"/>
+    <p:sldId id="269" r:id="rId12"/>
   </p:sldIdLst>
   <p:sldSz cx="24384000" cy="13716000"/>
   <p:notesSz cx="6858000" cy="9144000"/>
@@ -10570,6 +10571,260 @@
   <p:cSld>
     <p:spTree>
       <p:nvGrpSpPr>
+        <p:cNvPr id="1" name="Shape 147"/>
+        <p:cNvGrpSpPr/>
+        <p:nvPr/>
+      </p:nvGrpSpPr>
+      <p:grpSpPr>
+        <a:xfrm>
+          <a:off x="0" y="0"/>
+          <a:ext cx="0" cy="0"/>
+          <a:chOff x="0" y="0"/>
+          <a:chExt cx="0" cy="0"/>
+        </a:xfrm>
+      </p:grpSpPr>
+      <p:sp>
+        <p:nvSpPr>
+          <p:cNvPr id="148" name="Shape 148"/>
+          <p:cNvSpPr txBox="1">
+            <a:spLocks noGrp="1"/>
+          </p:cNvSpPr>
+          <p:nvPr>
+            <p:ph type="title"/>
+          </p:nvPr>
+        </p:nvSpPr>
+        <p:spPr>
+          <a:xfrm>
+            <a:off x="28970" y="625077"/>
+            <a:ext cx="24384000" cy="3036093"/>
+          </a:xfrm>
+          <a:prstGeom prst="rect">
+            <a:avLst/>
+          </a:prstGeom>
+          <a:noFill/>
+          <a:ln>
+            <a:noFill/>
+          </a:ln>
+        </p:spPr>
+        <p:txBody>
+          <a:bodyPr lIns="71425" tIns="71425" rIns="71425" bIns="71425" anchor="ctr" anchorCtr="0">
+            <a:noAutofit/>
+          </a:bodyPr>
+          <a:lstStyle/>
+          <a:p>
+            <a:pPr marL="0" marR="0" lvl="0" indent="0" algn="ctr" rtl="0">
+              <a:lnSpc>
+                <a:spcPct val="100000"/>
+              </a:lnSpc>
+              <a:spcBef>
+                <a:spcPts val="0"/>
+              </a:spcBef>
+              <a:spcAft>
+                <a:spcPts val="0"/>
+              </a:spcAft>
+              <a:buClr>
+                <a:srgbClr val="FFFFFF"/>
+              </a:buClr>
+              <a:buSzPct val="25000"/>
+              <a:buFont typeface="Arial"/>
+              <a:buNone/>
+            </a:pPr>
+            <a:r>
+              <a:rPr lang="en-US" sz="11200" b="0" i="0" u="none" strike="noStrike" cap="none">
+                <a:solidFill>
+                  <a:srgbClr val="FFFFFF"/>
+                </a:solidFill>
+                <a:latin typeface="Arial"/>
+                <a:ea typeface="Arial"/>
+                <a:cs typeface="Arial"/>
+                <a:sym typeface="Arial"/>
+              </a:rPr>
+              <a:t>Upcoming Meetups</a:t>
+            </a:r>
+          </a:p>
+        </p:txBody>
+      </p:sp>
+      <p:sp>
+        <p:nvSpPr>
+          <p:cNvPr id="149" name="Shape 149"/>
+          <p:cNvSpPr txBox="1">
+            <a:spLocks noGrp="1"/>
+          </p:cNvSpPr>
+          <p:nvPr>
+            <p:ph type="body" idx="1"/>
+          </p:nvPr>
+        </p:nvSpPr>
+        <p:spPr>
+          <a:xfrm>
+            <a:off x="2008186" y="3661171"/>
+            <a:ext cx="21196499" cy="7217351"/>
+          </a:xfrm>
+          <a:prstGeom prst="rect">
+            <a:avLst/>
+          </a:prstGeom>
+          <a:noFill/>
+          <a:ln>
+            <a:noFill/>
+          </a:ln>
+        </p:spPr>
+        <p:txBody>
+          <a:bodyPr lIns="71425" tIns="71425" rIns="71425" bIns="71425" anchor="t" anchorCtr="0">
+            <a:normAutofit fontScale="77500" lnSpcReduction="20000"/>
+          </a:bodyPr>
+          <a:lstStyle/>
+          <a:p>
+            <a:pPr marL="1143000" indent="-1143000"/>
+            <a:r>
+              <a:rPr lang="en-US" sz="8000" b="0" i="0" u="none" strike="noStrike" cap="none" dirty="0" smtClean="0">
+                <a:solidFill>
+                  <a:srgbClr val="000000"/>
+                </a:solidFill>
+                <a:latin typeface="Gill Sans"/>
+                <a:ea typeface="Arial"/>
+                <a:cs typeface="Gill Sans"/>
+                <a:sym typeface="Arial"/>
+              </a:rPr>
+              <a:t>December 13</a:t>
+            </a:r>
+          </a:p>
+          <a:p>
+            <a:pPr marL="1587500" lvl="1" indent="-1143000"/>
+            <a:r>
+              <a:rPr lang="en-US" sz="8000" dirty="0" smtClean="0">
+                <a:latin typeface="Gill Sans"/>
+                <a:cs typeface="Gill Sans"/>
+              </a:rPr>
+              <a:t>at </a:t>
+            </a:r>
+            <a:r>
+              <a:rPr lang="en-US" sz="8000" b="0" i="0" u="none" strike="noStrike" cap="none" dirty="0" err="1" smtClean="0">
+                <a:solidFill>
+                  <a:srgbClr val="000000"/>
+                </a:solidFill>
+                <a:latin typeface="Gill Sans"/>
+                <a:ea typeface="Arial"/>
+                <a:cs typeface="Gill Sans"/>
+                <a:sym typeface="Arial"/>
+              </a:rPr>
+              <a:t>Excella</a:t>
+            </a:r>
+            <a:r>
+              <a:rPr lang="en-US" sz="8000" b="0" i="0" u="none" strike="noStrike" cap="none" dirty="0" smtClean="0">
+                <a:solidFill>
+                  <a:srgbClr val="000000"/>
+                </a:solidFill>
+                <a:latin typeface="Gill Sans"/>
+                <a:ea typeface="Arial"/>
+                <a:cs typeface="Gill Sans"/>
+                <a:sym typeface="Arial"/>
+              </a:rPr>
+              <a:t> Consulting</a:t>
+            </a:r>
+          </a:p>
+          <a:p>
+            <a:pPr marL="1587500" lvl="1" indent="-1143000"/>
+            <a:r>
+              <a:rPr lang="en-US" sz="8000" dirty="0" smtClean="0">
+                <a:latin typeface="Gill Sans"/>
+                <a:cs typeface="Gill Sans"/>
+              </a:rPr>
+              <a:t>Presenters:</a:t>
+            </a:r>
+          </a:p>
+          <a:p>
+            <a:pPr marL="2032000" lvl="2" indent="-1143000"/>
+            <a:r>
+              <a:rPr lang="en-US" sz="8000" b="0" i="0" u="none" strike="noStrike" cap="none" dirty="0" smtClean="0">
+                <a:solidFill>
+                  <a:srgbClr val="000000"/>
+                </a:solidFill>
+                <a:latin typeface="Gill Sans"/>
+                <a:ea typeface="Arial"/>
+                <a:cs typeface="Gill Sans"/>
+                <a:sym typeface="Arial"/>
+              </a:rPr>
+              <a:t>Mark </a:t>
+            </a:r>
+            <a:r>
+              <a:rPr lang="en-US" sz="8000" b="0" i="0" u="none" strike="noStrike" cap="none" dirty="0" err="1" smtClean="0">
+                <a:solidFill>
+                  <a:srgbClr val="000000"/>
+                </a:solidFill>
+                <a:latin typeface="Gill Sans"/>
+                <a:ea typeface="Arial"/>
+                <a:cs typeface="Gill Sans"/>
+                <a:sym typeface="Arial"/>
+              </a:rPr>
+              <a:t>Cornick</a:t>
+            </a:r>
+            <a:endParaRPr lang="en-US" sz="8000" b="0" i="0" u="none" strike="noStrike" cap="none" dirty="0" smtClean="0">
+              <a:solidFill>
+                <a:srgbClr val="000000"/>
+              </a:solidFill>
+              <a:latin typeface="Gill Sans"/>
+              <a:ea typeface="Arial"/>
+              <a:cs typeface="Gill Sans"/>
+              <a:sym typeface="Arial"/>
+            </a:endParaRPr>
+          </a:p>
+          <a:p>
+            <a:pPr marL="2032000" lvl="2" indent="-1143000"/>
+            <a:r>
+              <a:rPr lang="en-US" sz="8000" b="0" i="0" u="none" strike="noStrike" cap="none" dirty="0" smtClean="0">
+                <a:solidFill>
+                  <a:srgbClr val="000000"/>
+                </a:solidFill>
+                <a:latin typeface="Gill Sans"/>
+                <a:ea typeface="Arial"/>
+                <a:cs typeface="Gill Sans"/>
+                <a:sym typeface="Arial"/>
+              </a:rPr>
+              <a:t>Valiant </a:t>
+            </a:r>
+            <a:r>
+              <a:rPr lang="en-US" sz="8000" b="0" i="0" u="none" strike="noStrike" cap="none" dirty="0" smtClean="0">
+                <a:solidFill>
+                  <a:srgbClr val="000000"/>
+                </a:solidFill>
+                <a:latin typeface="Gill Sans"/>
+                <a:ea typeface="Arial"/>
+                <a:cs typeface="Gill Sans"/>
+                <a:sym typeface="Arial"/>
+              </a:rPr>
+              <a:t>Solutions</a:t>
+            </a:r>
+            <a:endParaRPr lang="en-US" sz="8000" b="0" i="0" u="none" strike="noStrike" cap="none" dirty="0">
+              <a:solidFill>
+                <a:srgbClr val="000000"/>
+              </a:solidFill>
+              <a:latin typeface="Gill Sans"/>
+              <a:ea typeface="Arial"/>
+              <a:cs typeface="Gill Sans"/>
+              <a:sym typeface="Arial"/>
+            </a:endParaRPr>
+          </a:p>
+        </p:txBody>
+      </p:sp>
+    </p:spTree>
+  </p:cSld>
+  <p:clrMapOvr>
+    <a:masterClrMapping/>
+  </p:clrMapOvr>
+  <p:timing>
+    <p:tnLst>
+      <p:par>
+        <p:cTn xmlns:p14="http://schemas.microsoft.com/office/powerpoint/2010/main" id="1" dur="indefinite" restart="never" nodeType="tmRoot"/>
+      </p:par>
+    </p:tnLst>
+  </p:timing>
+</p:sld>
+</file>
+
+<file path=ppt/slides/slide11.xml><?xml version="1.0" encoding="utf-8"?>
+<p:sld xmlns:a="http://schemas.openxmlformats.org/drawingml/2006/main" xmlns:r="http://schemas.openxmlformats.org/officeDocument/2006/relationships" xmlns:p="http://schemas.openxmlformats.org/presentationml/2006/main">
+  <p:cSld>
+    <p:spTree>
+      <p:nvGrpSpPr>
         <p:cNvPr id="1" name="Shape 153"/>
         <p:cNvGrpSpPr/>
         <p:nvPr/>
@@ -12212,7 +12467,7 @@
   <p:cSld>
     <p:spTree>
       <p:nvGrpSpPr>
-        <p:cNvPr id="1" name="Shape 147"/>
+        <p:cNvPr id="1" name=""/>
         <p:cNvGrpSpPr/>
         <p:nvPr/>
       </p:nvGrpSpPr>
@@ -12226,238 +12481,70 @@
       </p:grpSpPr>
       <p:sp>
         <p:nvSpPr>
-          <p:cNvPr id="148" name="Shape 148"/>
-          <p:cNvSpPr txBox="1">
+          <p:cNvPr id="2" name="Title 1"/>
+          <p:cNvSpPr>
             <a:spLocks noGrp="1"/>
           </p:cNvSpPr>
           <p:nvPr>
             <p:ph type="title"/>
           </p:nvPr>
         </p:nvSpPr>
-        <p:spPr>
-          <a:xfrm>
-            <a:off x="28970" y="625077"/>
-            <a:ext cx="24384000" cy="3036093"/>
-          </a:xfrm>
-          <a:prstGeom prst="rect">
-            <a:avLst/>
-          </a:prstGeom>
-          <a:noFill/>
-          <a:ln>
-            <a:noFill/>
-          </a:ln>
-        </p:spPr>
+        <p:spPr/>
         <p:txBody>
-          <a:bodyPr lIns="71425" tIns="71425" rIns="71425" bIns="71425" anchor="ctr" anchorCtr="0">
-            <a:noAutofit/>
-          </a:bodyPr>
+          <a:bodyPr/>
           <a:lstStyle/>
           <a:p>
-            <a:pPr marL="0" marR="0" lvl="0" indent="0" algn="ctr" rtl="0">
-              <a:lnSpc>
-                <a:spcPct val="100000"/>
-              </a:lnSpc>
-              <a:spcBef>
-                <a:spcPts val="0"/>
-              </a:spcBef>
-              <a:spcAft>
-                <a:spcPts val="0"/>
-              </a:spcAft>
-              <a:buClr>
-                <a:srgbClr val="FFFFFF"/>
-              </a:buClr>
-              <a:buSzPct val="25000"/>
-              <a:buFont typeface="Arial"/>
-              <a:buNone/>
-            </a:pPr>
             <a:r>
-              <a:rPr lang="en-US" sz="11200" b="0" i="0" u="none" strike="noStrike" cap="none">
-                <a:solidFill>
-                  <a:srgbClr val="FFFFFF"/>
-                </a:solidFill>
-                <a:latin typeface="Arial"/>
-                <a:ea typeface="Arial"/>
-                <a:cs typeface="Arial"/>
-                <a:sym typeface="Arial"/>
-              </a:rPr>
-              <a:t>Upcoming Meetups</a:t>
+              <a:rPr lang="en-US" dirty="0" err="1" smtClean="0"/>
+              <a:t>Habiat</a:t>
             </a:r>
+            <a:r>
+              <a:rPr lang="en-US" dirty="0" smtClean="0"/>
+              <a:t> Hack Night</a:t>
+            </a:r>
+            <a:endParaRPr lang="en-US" dirty="0"/>
           </a:p>
         </p:txBody>
       </p:sp>
       <p:sp>
         <p:nvSpPr>
-          <p:cNvPr id="149" name="Shape 149"/>
-          <p:cNvSpPr txBox="1">
+          <p:cNvPr id="3" name="Text Placeholder 2"/>
+          <p:cNvSpPr>
             <a:spLocks noGrp="1"/>
           </p:cNvSpPr>
           <p:nvPr>
             <p:ph type="body" idx="1"/>
           </p:nvPr>
         </p:nvSpPr>
-        <p:spPr>
-          <a:xfrm>
-            <a:off x="2008186" y="3661171"/>
-            <a:ext cx="21196499" cy="7217351"/>
-          </a:xfrm>
-          <a:prstGeom prst="rect">
-            <a:avLst/>
-          </a:prstGeom>
-          <a:noFill/>
-          <a:ln>
-            <a:noFill/>
-          </a:ln>
-        </p:spPr>
+        <p:spPr/>
         <p:txBody>
-          <a:bodyPr lIns="71425" tIns="71425" rIns="71425" bIns="71425" anchor="t" anchorCtr="0">
-            <a:normAutofit fontScale="77500" lnSpcReduction="20000"/>
-          </a:bodyPr>
+          <a:bodyPr/>
           <a:lstStyle/>
           <a:p>
-            <a:pPr marL="1143000" indent="-1143000"/>
             <a:r>
-              <a:rPr lang="en-US" sz="8000" b="0" i="0" u="none" strike="noStrike" cap="none" dirty="0" smtClean="0">
-                <a:solidFill>
-                  <a:srgbClr val="000000"/>
-                </a:solidFill>
-                <a:latin typeface="Gill Sans"/>
-                <a:ea typeface="Arial"/>
-                <a:cs typeface="Gill Sans"/>
-                <a:sym typeface="Arial"/>
-              </a:rPr>
-              <a:t>December 13</a:t>
+              <a:rPr lang="en-US" dirty="0" smtClean="0"/>
+              <a:t>December 6</a:t>
             </a:r>
           </a:p>
           <a:p>
-            <a:pPr marL="1587500" lvl="1" indent="-1143000"/>
             <a:r>
-              <a:rPr lang="en-US" sz="8000" dirty="0" smtClean="0">
-                <a:latin typeface="Gill Sans"/>
-                <a:cs typeface="Gill Sans"/>
-              </a:rPr>
-              <a:t>at </a:t>
+              <a:rPr lang="en-US" dirty="0" err="1" smtClean="0"/>
+              <a:t>Optoro</a:t>
             </a:r>
-            <a:r>
-              <a:rPr lang="en-US" sz="8000" b="0" i="0" u="none" strike="noStrike" cap="none" dirty="0" err="1" smtClean="0">
-                <a:solidFill>
-                  <a:srgbClr val="000000"/>
-                </a:solidFill>
-                <a:latin typeface="Gill Sans"/>
-                <a:ea typeface="Arial"/>
-                <a:cs typeface="Gill Sans"/>
-                <a:sym typeface="Arial"/>
-              </a:rPr>
-              <a:t>Excella</a:t>
-            </a:r>
-            <a:r>
-              <a:rPr lang="en-US" sz="8000" b="0" i="0" u="none" strike="noStrike" cap="none" dirty="0" smtClean="0">
-                <a:solidFill>
-                  <a:srgbClr val="000000"/>
-                </a:solidFill>
-                <a:latin typeface="Gill Sans"/>
-                <a:ea typeface="Arial"/>
-                <a:cs typeface="Gill Sans"/>
-                <a:sym typeface="Arial"/>
-              </a:rPr>
-              <a:t> Consulting</a:t>
-            </a:r>
-          </a:p>
-          <a:p>
-            <a:pPr marL="1587500" lvl="1" indent="-1143000"/>
-            <a:r>
-              <a:rPr lang="en-US" sz="8000" dirty="0" smtClean="0">
-                <a:latin typeface="Gill Sans"/>
-                <a:cs typeface="Gill Sans"/>
-              </a:rPr>
-              <a:t>Presenters:</a:t>
-            </a:r>
-          </a:p>
-          <a:p>
-            <a:pPr marL="2032000" lvl="2" indent="-1143000"/>
-            <a:r>
-              <a:rPr lang="en-US" sz="8000" b="0" i="0" u="none" strike="noStrike" cap="none" dirty="0" smtClean="0">
-                <a:solidFill>
-                  <a:srgbClr val="000000"/>
-                </a:solidFill>
-                <a:latin typeface="Gill Sans"/>
-                <a:ea typeface="Arial"/>
-                <a:cs typeface="Gill Sans"/>
-                <a:sym typeface="Arial"/>
-              </a:rPr>
-              <a:t>Mark </a:t>
-            </a:r>
-            <a:r>
-              <a:rPr lang="en-US" sz="8000" b="0" i="0" u="none" strike="noStrike" cap="none" dirty="0" err="1" smtClean="0">
-                <a:solidFill>
-                  <a:srgbClr val="000000"/>
-                </a:solidFill>
-                <a:latin typeface="Gill Sans"/>
-                <a:ea typeface="Arial"/>
-                <a:cs typeface="Gill Sans"/>
-                <a:sym typeface="Arial"/>
-              </a:rPr>
-              <a:t>Cornick</a:t>
-            </a:r>
-            <a:endParaRPr lang="en-US" sz="8000" b="0" i="0" u="none" strike="noStrike" cap="none" dirty="0" smtClean="0">
-              <a:solidFill>
-                <a:srgbClr val="000000"/>
-              </a:solidFill>
-              <a:latin typeface="Gill Sans"/>
-              <a:ea typeface="Arial"/>
-              <a:cs typeface="Gill Sans"/>
-              <a:sym typeface="Arial"/>
-            </a:endParaRPr>
-          </a:p>
-          <a:p>
-            <a:pPr marL="2032000" lvl="2" indent="-1143000"/>
-            <a:r>
-              <a:rPr lang="en-US" sz="8000" b="0" i="0" u="none" strike="noStrike" cap="none" dirty="0" smtClean="0">
-                <a:solidFill>
-                  <a:srgbClr val="000000"/>
-                </a:solidFill>
-                <a:latin typeface="Gill Sans"/>
-                <a:ea typeface="Arial"/>
-                <a:cs typeface="Gill Sans"/>
-                <a:sym typeface="Arial"/>
-              </a:rPr>
-              <a:t>Valiant </a:t>
-            </a:r>
-            <a:r>
-              <a:rPr lang="en-US" sz="8000" b="0" i="0" u="none" strike="noStrike" cap="none" dirty="0" smtClean="0">
-                <a:solidFill>
-                  <a:srgbClr val="000000"/>
-                </a:solidFill>
-                <a:latin typeface="Gill Sans"/>
-                <a:ea typeface="Arial"/>
-                <a:cs typeface="Gill Sans"/>
-                <a:sym typeface="Arial"/>
-              </a:rPr>
-              <a:t>Solutions</a:t>
-            </a:r>
-            <a:endParaRPr lang="en-US" sz="8000" b="0" i="0" u="none" strike="noStrike" cap="none" dirty="0">
-              <a:solidFill>
-                <a:srgbClr val="000000"/>
-              </a:solidFill>
-              <a:latin typeface="Gill Sans"/>
-              <a:ea typeface="Arial"/>
-              <a:cs typeface="Gill Sans"/>
-              <a:sym typeface="Arial"/>
-            </a:endParaRPr>
+            <a:endParaRPr lang="en-US" dirty="0"/>
           </a:p>
         </p:txBody>
       </p:sp>
     </p:spTree>
+    <p:extLst>
+      <p:ext uri="{BB962C8B-B14F-4D97-AF65-F5344CB8AC3E}">
+        <p14:creationId xmlns:p14="http://schemas.microsoft.com/office/powerpoint/2010/main" val="3739231118"/>
+      </p:ext>
+    </p:extLst>
   </p:cSld>
   <p:clrMapOvr>
     <a:masterClrMapping/>
   </p:clrMapOvr>
-  <p:timing>
-    <p:tnLst>
-      <p:par>
-        <p:cTn xmlns:p14="http://schemas.microsoft.com/office/powerpoint/2010/main" id="1" dur="indefinite" restart="never" nodeType="tmRoot"/>
-      </p:par>
-    </p:tnLst>
-  </p:timing>
 </p:sld>
 </file>
 

</xml_diff>

<commit_message>
Update the evolenthealth logo
Signed-off-by: Nathen Harvey <nharvey@chef.io>
</commit_message>
<xml_diff>
--- a/pdf/DevOpsDC Nov 2016.pptx
+++ b/pdf/DevOpsDC Nov 2016.pptx
@@ -11115,6 +11115,36 @@
           <a:chExt cx="0" cy="0"/>
         </a:xfrm>
       </p:grpSpPr>
+      <p:pic>
+        <p:nvPicPr>
+          <p:cNvPr id="18" name="Picture 17" descr="evolent-RGB.png"/>
+          <p:cNvPicPr>
+            <a:picLocks noChangeAspect="1"/>
+          </p:cNvPicPr>
+          <p:nvPr/>
+        </p:nvPicPr>
+        <p:blipFill>
+          <a:blip r:embed="rId3">
+            <a:extLst>
+              <a:ext uri="{28A0092B-C50C-407E-A947-70E740481C1C}">
+                <a14:useLocalDpi xmlns:a14="http://schemas.microsoft.com/office/drawing/2010/main" val="0"/>
+              </a:ext>
+            </a:extLst>
+          </a:blip>
+          <a:stretch>
+            <a:fillRect/>
+          </a:stretch>
+        </p:blipFill>
+        <p:spPr>
+          <a:xfrm>
+            <a:off x="12743281" y="8576234"/>
+            <a:ext cx="7264342" cy="1761603"/>
+          </a:xfrm>
+          <a:prstGeom prst="rect">
+            <a:avLst/>
+          </a:prstGeom>
+        </p:spPr>
+      </p:pic>
       <p:sp>
         <p:nvSpPr>
           <p:cNvPr id="76" name="Shape 76"/>
@@ -11185,7 +11215,7 @@
           <p:nvPr/>
         </p:nvPicPr>
         <p:blipFill>
-          <a:blip r:embed="rId3">
+          <a:blip r:embed="rId4">
             <a:extLst>
               <a:ext uri="{28A0092B-C50C-407E-A947-70E740481C1C}">
                 <a14:useLocalDpi xmlns:a14="http://schemas.microsoft.com/office/drawing/2010/main" val="0"/>
@@ -11213,7 +11243,7 @@
           <p:nvPr/>
         </p:nvPicPr>
         <p:blipFill rotWithShape="1">
-          <a:blip r:embed="rId4">
+          <a:blip r:embed="rId5">
             <a:alphaModFix/>
           </a:blip>
           <a:srcRect/>
@@ -11231,36 +11261,6 @@
           <a:ln>
             <a:noFill/>
           </a:ln>
-        </p:spPr>
-      </p:pic>
-      <p:pic>
-        <p:nvPicPr>
-          <p:cNvPr id="7" name="Picture 6" descr="logo.png"/>
-          <p:cNvPicPr>
-            <a:picLocks noChangeAspect="1"/>
-          </p:cNvPicPr>
-          <p:nvPr/>
-        </p:nvPicPr>
-        <p:blipFill>
-          <a:blip r:embed="rId5">
-            <a:extLst>
-              <a:ext uri="{28A0092B-C50C-407E-A947-70E740481C1C}">
-                <a14:useLocalDpi xmlns:a14="http://schemas.microsoft.com/office/drawing/2010/main" val="0"/>
-              </a:ext>
-            </a:extLst>
-          </a:blip>
-          <a:stretch>
-            <a:fillRect/>
-          </a:stretch>
-        </p:blipFill>
-        <p:spPr>
-          <a:xfrm>
-            <a:off x="12715550" y="8572909"/>
-            <a:ext cx="7320439" cy="1761603"/>
-          </a:xfrm>
-          <a:prstGeom prst="rect">
-            <a:avLst/>
-          </a:prstGeom>
         </p:spPr>
       </p:pic>
     </p:spTree>

</xml_diff>